<commit_message>
final results pptx updated
</commit_message>
<xml_diff>
--- a/powerpoints_and_videos/phase2a_scan_results/phase_2a_alpha_w_scan_results.pptx
+++ b/powerpoints_and_videos/phase2a_scan_results/phase_2a_alpha_w_scan_results.pptx
@@ -2,20 +2,24 @@
 <file path=ppt/presentation.xml><?xml version="1.0" encoding="utf-8"?>
 <p:presentation xmlns:a="http://schemas.openxmlformats.org/drawingml/2006/main" xmlns:r="http://schemas.openxmlformats.org/officeDocument/2006/relationships" xmlns:p="http://schemas.openxmlformats.org/presentationml/2006/main" saveSubsetFonts="1" autoCompressPictures="0">
   <p:sldMasterIdLst>
-    <p:sldMasterId id="2147483660" r:id="rId1"/>
+    <p:sldMasterId id="2147483672" r:id="rId1"/>
   </p:sldMasterIdLst>
   <p:sldIdLst>
-    <p:sldId id="259" r:id="rId2"/>
-    <p:sldId id="260" r:id="rId3"/>
-    <p:sldId id="261" r:id="rId4"/>
-    <p:sldId id="262" r:id="rId5"/>
-    <p:sldId id="263" r:id="rId6"/>
-    <p:sldId id="264" r:id="rId7"/>
-    <p:sldId id="265" r:id="rId8"/>
-    <p:sldId id="266" r:id="rId9"/>
-    <p:sldId id="267" r:id="rId10"/>
+    <p:sldId id="280" r:id="rId2"/>
+    <p:sldId id="281" r:id="rId3"/>
+    <p:sldId id="282" r:id="rId4"/>
+    <p:sldId id="283" r:id="rId5"/>
+    <p:sldId id="284" r:id="rId6"/>
+    <p:sldId id="285" r:id="rId7"/>
+    <p:sldId id="286" r:id="rId8"/>
+    <p:sldId id="287" r:id="rId9"/>
+    <p:sldId id="288" r:id="rId10"/>
+    <p:sldId id="289" r:id="rId11"/>
+    <p:sldId id="290" r:id="rId12"/>
+    <p:sldId id="291" r:id="rId13"/>
+    <p:sldId id="292" r:id="rId14"/>
   </p:sldIdLst>
-  <p:sldSz cx="10972800" cy="18288000"/>
+  <p:sldSz cx="10972800" cy="16459200"/>
   <p:notesSz cx="6858000" cy="9144000"/>
   <p:defaultTextStyle>
     <a:defPPr>
@@ -115,7 +119,7 @@
   <p:extLst>
     <p:ext uri="{EFAFB233-063F-42B5-8137-9DF3F51BA10A}">
       <p15:sldGuideLst xmlns:p15="http://schemas.microsoft.com/office/powerpoint/2012/main">
-        <p15:guide id="1" orient="horz" pos="5760" userDrawn="1">
+        <p15:guide id="1" orient="horz" pos="5184" userDrawn="1">
           <p15:clr>
             <a:srgbClr val="A4A3A4"/>
           </p15:clr>
@@ -160,8 +164,8 @@
         </p:nvSpPr>
         <p:spPr>
           <a:xfrm>
-            <a:off x="822960" y="2992968"/>
-            <a:ext cx="9326880" cy="6366933"/>
+            <a:off x="822960" y="2693671"/>
+            <a:ext cx="9326880" cy="5730240"/>
           </a:xfrm>
         </p:spPr>
         <p:txBody>
@@ -192,8 +196,8 @@
         </p:nvSpPr>
         <p:spPr>
           <a:xfrm>
-            <a:off x="1371600" y="9605435"/>
-            <a:ext cx="8229600" cy="4415365"/>
+            <a:off x="1371600" y="8644891"/>
+            <a:ext cx="8229600" cy="3973829"/>
           </a:xfrm>
         </p:spPr>
         <p:txBody>
@@ -262,7 +266,7 @@
           <a:p>
             <a:fld id="{BC23EB03-8D51-F84B-8A89-B0A0A1638103}" type="datetimeFigureOut">
               <a:rPr lang="en-US" smtClean="0"/>
-              <a:t>5/6/25</a:t>
+              <a:t>5/8/25</a:t>
             </a:fld>
             <a:endParaRPr lang="en-US"/>
           </a:p>
@@ -313,7 +317,7 @@
     </p:spTree>
     <p:extLst>
       <p:ext uri="{BB962C8B-B14F-4D97-AF65-F5344CB8AC3E}">
-        <p14:creationId xmlns:p14="http://schemas.microsoft.com/office/powerpoint/2010/main" val="3834503187"/>
+        <p14:creationId xmlns:p14="http://schemas.microsoft.com/office/powerpoint/2010/main" val="3832876908"/>
       </p:ext>
     </p:extLst>
   </p:cSld>
@@ -432,7 +436,7 @@
           <a:p>
             <a:fld id="{BC23EB03-8D51-F84B-8A89-B0A0A1638103}" type="datetimeFigureOut">
               <a:rPr lang="en-US" smtClean="0"/>
-              <a:t>5/6/25</a:t>
+              <a:t>5/8/25</a:t>
             </a:fld>
             <a:endParaRPr lang="en-US"/>
           </a:p>
@@ -483,7 +487,7 @@
     </p:spTree>
     <p:extLst>
       <p:ext uri="{BB962C8B-B14F-4D97-AF65-F5344CB8AC3E}">
-        <p14:creationId xmlns:p14="http://schemas.microsoft.com/office/powerpoint/2010/main" val="291493713"/>
+        <p14:creationId xmlns:p14="http://schemas.microsoft.com/office/powerpoint/2010/main" val="2439058833"/>
       </p:ext>
     </p:extLst>
   </p:cSld>
@@ -522,8 +526,8 @@
         </p:nvSpPr>
         <p:spPr>
           <a:xfrm>
-            <a:off x="7852411" y="973666"/>
-            <a:ext cx="2366010" cy="15498235"/>
+            <a:off x="7852411" y="876300"/>
+            <a:ext cx="2366010" cy="13948411"/>
           </a:xfrm>
         </p:spPr>
         <p:txBody>
@@ -550,8 +554,8 @@
         </p:nvSpPr>
         <p:spPr>
           <a:xfrm>
-            <a:off x="754381" y="973666"/>
-            <a:ext cx="6960870" cy="15498235"/>
+            <a:off x="754381" y="876300"/>
+            <a:ext cx="6960870" cy="13948411"/>
           </a:xfrm>
         </p:spPr>
         <p:txBody>
@@ -612,7 +616,7 @@
           <a:p>
             <a:fld id="{BC23EB03-8D51-F84B-8A89-B0A0A1638103}" type="datetimeFigureOut">
               <a:rPr lang="en-US" smtClean="0"/>
-              <a:t>5/6/25</a:t>
+              <a:t>5/8/25</a:t>
             </a:fld>
             <a:endParaRPr lang="en-US"/>
           </a:p>
@@ -663,7 +667,7 @@
     </p:spTree>
     <p:extLst>
       <p:ext uri="{BB962C8B-B14F-4D97-AF65-F5344CB8AC3E}">
-        <p14:creationId xmlns:p14="http://schemas.microsoft.com/office/powerpoint/2010/main" val="3895729310"/>
+        <p14:creationId xmlns:p14="http://schemas.microsoft.com/office/powerpoint/2010/main" val="2448531968"/>
       </p:ext>
     </p:extLst>
   </p:cSld>
@@ -782,7 +786,7 @@
           <a:p>
             <a:fld id="{BC23EB03-8D51-F84B-8A89-B0A0A1638103}" type="datetimeFigureOut">
               <a:rPr lang="en-US" smtClean="0"/>
-              <a:t>5/6/25</a:t>
+              <a:t>5/8/25</a:t>
             </a:fld>
             <a:endParaRPr lang="en-US"/>
           </a:p>
@@ -833,7 +837,7 @@
     </p:spTree>
     <p:extLst>
       <p:ext uri="{BB962C8B-B14F-4D97-AF65-F5344CB8AC3E}">
-        <p14:creationId xmlns:p14="http://schemas.microsoft.com/office/powerpoint/2010/main" val="3115761962"/>
+        <p14:creationId xmlns:p14="http://schemas.microsoft.com/office/powerpoint/2010/main" val="2092355796"/>
       </p:ext>
     </p:extLst>
   </p:cSld>
@@ -872,8 +876,8 @@
         </p:nvSpPr>
         <p:spPr>
           <a:xfrm>
-            <a:off x="748666" y="4559305"/>
-            <a:ext cx="9464040" cy="7607299"/>
+            <a:off x="748666" y="4103375"/>
+            <a:ext cx="9464040" cy="6846569"/>
           </a:xfrm>
         </p:spPr>
         <p:txBody>
@@ -904,8 +908,8 @@
         </p:nvSpPr>
         <p:spPr>
           <a:xfrm>
-            <a:off x="748666" y="12238572"/>
-            <a:ext cx="9464040" cy="4000499"/>
+            <a:off x="748666" y="11014715"/>
+            <a:ext cx="9464040" cy="3600449"/>
           </a:xfrm>
         </p:spPr>
         <p:txBody>
@@ -1028,7 +1032,7 @@
           <a:p>
             <a:fld id="{BC23EB03-8D51-F84B-8A89-B0A0A1638103}" type="datetimeFigureOut">
               <a:rPr lang="en-US" smtClean="0"/>
-              <a:t>5/6/25</a:t>
+              <a:t>5/8/25</a:t>
             </a:fld>
             <a:endParaRPr lang="en-US"/>
           </a:p>
@@ -1079,7 +1083,7 @@
     </p:spTree>
     <p:extLst>
       <p:ext uri="{BB962C8B-B14F-4D97-AF65-F5344CB8AC3E}">
-        <p14:creationId xmlns:p14="http://schemas.microsoft.com/office/powerpoint/2010/main" val="1333772397"/>
+        <p14:creationId xmlns:p14="http://schemas.microsoft.com/office/powerpoint/2010/main" val="402683137"/>
       </p:ext>
     </p:extLst>
   </p:cSld>
@@ -1141,8 +1145,8 @@
         </p:nvSpPr>
         <p:spPr>
           <a:xfrm>
-            <a:off x="754380" y="4868333"/>
-            <a:ext cx="4663440" cy="11603568"/>
+            <a:off x="754380" y="4381500"/>
+            <a:ext cx="4663440" cy="10443211"/>
           </a:xfrm>
         </p:spPr>
         <p:txBody>
@@ -1198,8 +1202,8 @@
         </p:nvSpPr>
         <p:spPr>
           <a:xfrm>
-            <a:off x="5554980" y="4868333"/>
-            <a:ext cx="4663440" cy="11603568"/>
+            <a:off x="5554980" y="4381500"/>
+            <a:ext cx="4663440" cy="10443211"/>
           </a:xfrm>
         </p:spPr>
         <p:txBody>
@@ -1260,7 +1264,7 @@
           <a:p>
             <a:fld id="{BC23EB03-8D51-F84B-8A89-B0A0A1638103}" type="datetimeFigureOut">
               <a:rPr lang="en-US" smtClean="0"/>
-              <a:t>5/6/25</a:t>
+              <a:t>5/8/25</a:t>
             </a:fld>
             <a:endParaRPr lang="en-US"/>
           </a:p>
@@ -1311,7 +1315,7 @@
     </p:spTree>
     <p:extLst>
       <p:ext uri="{BB962C8B-B14F-4D97-AF65-F5344CB8AC3E}">
-        <p14:creationId xmlns:p14="http://schemas.microsoft.com/office/powerpoint/2010/main" val="858232927"/>
+        <p14:creationId xmlns:p14="http://schemas.microsoft.com/office/powerpoint/2010/main" val="197624245"/>
       </p:ext>
     </p:extLst>
   </p:cSld>
@@ -1350,8 +1354,8 @@
         </p:nvSpPr>
         <p:spPr>
           <a:xfrm>
-            <a:off x="755809" y="973670"/>
-            <a:ext cx="9464040" cy="3534835"/>
+            <a:off x="755809" y="876304"/>
+            <a:ext cx="9464040" cy="3181351"/>
           </a:xfrm>
         </p:spPr>
         <p:txBody>
@@ -1378,8 +1382,8 @@
         </p:nvSpPr>
         <p:spPr>
           <a:xfrm>
-            <a:off x="755810" y="4483101"/>
-            <a:ext cx="4642008" cy="2197099"/>
+            <a:off x="755810" y="4034791"/>
+            <a:ext cx="4642008" cy="1977389"/>
           </a:xfrm>
         </p:spPr>
         <p:txBody>
@@ -1443,8 +1447,8 @@
         </p:nvSpPr>
         <p:spPr>
           <a:xfrm>
-            <a:off x="755810" y="6680200"/>
-            <a:ext cx="4642008" cy="9825568"/>
+            <a:off x="755810" y="6012180"/>
+            <a:ext cx="4642008" cy="8843011"/>
           </a:xfrm>
         </p:spPr>
         <p:txBody>
@@ -1500,8 +1504,8 @@
         </p:nvSpPr>
         <p:spPr>
           <a:xfrm>
-            <a:off x="5554981" y="4483101"/>
-            <a:ext cx="4664869" cy="2197099"/>
+            <a:off x="5554981" y="4034791"/>
+            <a:ext cx="4664869" cy="1977389"/>
           </a:xfrm>
         </p:spPr>
         <p:txBody>
@@ -1565,8 +1569,8 @@
         </p:nvSpPr>
         <p:spPr>
           <a:xfrm>
-            <a:off x="5554981" y="6680200"/>
-            <a:ext cx="4664869" cy="9825568"/>
+            <a:off x="5554981" y="6012180"/>
+            <a:ext cx="4664869" cy="8843011"/>
           </a:xfrm>
         </p:spPr>
         <p:txBody>
@@ -1627,7 +1631,7 @@
           <a:p>
             <a:fld id="{BC23EB03-8D51-F84B-8A89-B0A0A1638103}" type="datetimeFigureOut">
               <a:rPr lang="en-US" smtClean="0"/>
-              <a:t>5/6/25</a:t>
+              <a:t>5/8/25</a:t>
             </a:fld>
             <a:endParaRPr lang="en-US"/>
           </a:p>
@@ -1678,7 +1682,7 @@
     </p:spTree>
     <p:extLst>
       <p:ext uri="{BB962C8B-B14F-4D97-AF65-F5344CB8AC3E}">
-        <p14:creationId xmlns:p14="http://schemas.microsoft.com/office/powerpoint/2010/main" val="3675103349"/>
+        <p14:creationId xmlns:p14="http://schemas.microsoft.com/office/powerpoint/2010/main" val="1373501986"/>
       </p:ext>
     </p:extLst>
   </p:cSld>
@@ -1745,7 +1749,7 @@
           <a:p>
             <a:fld id="{BC23EB03-8D51-F84B-8A89-B0A0A1638103}" type="datetimeFigureOut">
               <a:rPr lang="en-US" smtClean="0"/>
-              <a:t>5/6/25</a:t>
+              <a:t>5/8/25</a:t>
             </a:fld>
             <a:endParaRPr lang="en-US"/>
           </a:p>
@@ -1796,7 +1800,7 @@
     </p:spTree>
     <p:extLst>
       <p:ext uri="{BB962C8B-B14F-4D97-AF65-F5344CB8AC3E}">
-        <p14:creationId xmlns:p14="http://schemas.microsoft.com/office/powerpoint/2010/main" val="2172066488"/>
+        <p14:creationId xmlns:p14="http://schemas.microsoft.com/office/powerpoint/2010/main" val="3291128559"/>
       </p:ext>
     </p:extLst>
   </p:cSld>
@@ -1840,7 +1844,7 @@
           <a:p>
             <a:fld id="{BC23EB03-8D51-F84B-8A89-B0A0A1638103}" type="datetimeFigureOut">
               <a:rPr lang="en-US" smtClean="0"/>
-              <a:t>5/6/25</a:t>
+              <a:t>5/8/25</a:t>
             </a:fld>
             <a:endParaRPr lang="en-US"/>
           </a:p>
@@ -1891,7 +1895,7 @@
     </p:spTree>
     <p:extLst>
       <p:ext uri="{BB962C8B-B14F-4D97-AF65-F5344CB8AC3E}">
-        <p14:creationId xmlns:p14="http://schemas.microsoft.com/office/powerpoint/2010/main" val="4176490264"/>
+        <p14:creationId xmlns:p14="http://schemas.microsoft.com/office/powerpoint/2010/main" val="2849637466"/>
       </p:ext>
     </p:extLst>
   </p:cSld>
@@ -1930,8 +1934,8 @@
         </p:nvSpPr>
         <p:spPr>
           <a:xfrm>
-            <a:off x="755809" y="1219200"/>
-            <a:ext cx="3539014" cy="4267200"/>
+            <a:off x="755809" y="1097280"/>
+            <a:ext cx="3539014" cy="3840480"/>
           </a:xfrm>
         </p:spPr>
         <p:txBody>
@@ -1962,8 +1966,8 @@
         </p:nvSpPr>
         <p:spPr>
           <a:xfrm>
-            <a:off x="4664869" y="2633137"/>
-            <a:ext cx="5554980" cy="12996333"/>
+            <a:off x="4664869" y="2369824"/>
+            <a:ext cx="5554980" cy="11696700"/>
           </a:xfrm>
         </p:spPr>
         <p:txBody>
@@ -2047,8 +2051,8 @@
         </p:nvSpPr>
         <p:spPr>
           <a:xfrm>
-            <a:off x="755809" y="5486400"/>
-            <a:ext cx="3539014" cy="10164235"/>
+            <a:off x="755809" y="4937760"/>
+            <a:ext cx="3539014" cy="9147811"/>
           </a:xfrm>
         </p:spPr>
         <p:txBody>
@@ -2117,7 +2121,7 @@
           <a:p>
             <a:fld id="{BC23EB03-8D51-F84B-8A89-B0A0A1638103}" type="datetimeFigureOut">
               <a:rPr lang="en-US" smtClean="0"/>
-              <a:t>5/6/25</a:t>
+              <a:t>5/8/25</a:t>
             </a:fld>
             <a:endParaRPr lang="en-US"/>
           </a:p>
@@ -2168,7 +2172,7 @@
     </p:spTree>
     <p:extLst>
       <p:ext uri="{BB962C8B-B14F-4D97-AF65-F5344CB8AC3E}">
-        <p14:creationId xmlns:p14="http://schemas.microsoft.com/office/powerpoint/2010/main" val="1303326736"/>
+        <p14:creationId xmlns:p14="http://schemas.microsoft.com/office/powerpoint/2010/main" val="2172350229"/>
       </p:ext>
     </p:extLst>
   </p:cSld>
@@ -2207,8 +2211,8 @@
         </p:nvSpPr>
         <p:spPr>
           <a:xfrm>
-            <a:off x="755809" y="1219200"/>
-            <a:ext cx="3539014" cy="4267200"/>
+            <a:off x="755809" y="1097280"/>
+            <a:ext cx="3539014" cy="3840480"/>
           </a:xfrm>
         </p:spPr>
         <p:txBody>
@@ -2239,8 +2243,8 @@
         </p:nvSpPr>
         <p:spPr>
           <a:xfrm>
-            <a:off x="4664869" y="2633137"/>
-            <a:ext cx="5554980" cy="12996333"/>
+            <a:off x="4664869" y="2369824"/>
+            <a:ext cx="5554980" cy="11696700"/>
           </a:xfrm>
         </p:spPr>
         <p:txBody>
@@ -2304,8 +2308,8 @@
         </p:nvSpPr>
         <p:spPr>
           <a:xfrm>
-            <a:off x="755809" y="5486400"/>
-            <a:ext cx="3539014" cy="10164235"/>
+            <a:off x="755809" y="4937760"/>
+            <a:ext cx="3539014" cy="9147811"/>
           </a:xfrm>
         </p:spPr>
         <p:txBody>
@@ -2374,7 +2378,7 @@
           <a:p>
             <a:fld id="{BC23EB03-8D51-F84B-8A89-B0A0A1638103}" type="datetimeFigureOut">
               <a:rPr lang="en-US" smtClean="0"/>
-              <a:t>5/6/25</a:t>
+              <a:t>5/8/25</a:t>
             </a:fld>
             <a:endParaRPr lang="en-US"/>
           </a:p>
@@ -2425,7 +2429,7 @@
     </p:spTree>
     <p:extLst>
       <p:ext uri="{BB962C8B-B14F-4D97-AF65-F5344CB8AC3E}">
-        <p14:creationId xmlns:p14="http://schemas.microsoft.com/office/powerpoint/2010/main" val="2331552229"/>
+        <p14:creationId xmlns:p14="http://schemas.microsoft.com/office/powerpoint/2010/main" val="3687858820"/>
       </p:ext>
     </p:extLst>
   </p:cSld>
@@ -2469,8 +2473,8 @@
         </p:nvSpPr>
         <p:spPr>
           <a:xfrm>
-            <a:off x="754380" y="973670"/>
-            <a:ext cx="9464040" cy="3534835"/>
+            <a:off x="754380" y="876304"/>
+            <a:ext cx="9464040" cy="3181351"/>
           </a:xfrm>
           <a:prstGeom prst="rect">
             <a:avLst/>
@@ -2502,8 +2506,8 @@
         </p:nvSpPr>
         <p:spPr>
           <a:xfrm>
-            <a:off x="754380" y="4868333"/>
-            <a:ext cx="9464040" cy="11603568"/>
+            <a:off x="754380" y="4381500"/>
+            <a:ext cx="9464040" cy="10443211"/>
           </a:xfrm>
           <a:prstGeom prst="rect">
             <a:avLst/>
@@ -2564,8 +2568,8 @@
         </p:nvSpPr>
         <p:spPr>
           <a:xfrm>
-            <a:off x="754380" y="16950271"/>
-            <a:ext cx="2468880" cy="973667"/>
+            <a:off x="754380" y="15255244"/>
+            <a:ext cx="2468880" cy="876300"/>
           </a:xfrm>
           <a:prstGeom prst="rect">
             <a:avLst/>
@@ -2587,7 +2591,7 @@
           <a:p>
             <a:fld id="{BC23EB03-8D51-F84B-8A89-B0A0A1638103}" type="datetimeFigureOut">
               <a:rPr lang="en-US" smtClean="0"/>
-              <a:t>5/6/25</a:t>
+              <a:t>5/8/25</a:t>
             </a:fld>
             <a:endParaRPr lang="en-US"/>
           </a:p>
@@ -2605,8 +2609,8 @@
         </p:nvSpPr>
         <p:spPr>
           <a:xfrm>
-            <a:off x="3634740" y="16950271"/>
-            <a:ext cx="3703320" cy="973667"/>
+            <a:off x="3634740" y="15255244"/>
+            <a:ext cx="3703320" cy="876300"/>
           </a:xfrm>
           <a:prstGeom prst="rect">
             <a:avLst/>
@@ -2642,8 +2646,8 @@
         </p:nvSpPr>
         <p:spPr>
           <a:xfrm>
-            <a:off x="7749540" y="16950271"/>
-            <a:ext cx="2468880" cy="973667"/>
+            <a:off x="7749540" y="15255244"/>
+            <a:ext cx="2468880" cy="876300"/>
           </a:xfrm>
           <a:prstGeom prst="rect">
             <a:avLst/>
@@ -2674,23 +2678,23 @@
     </p:spTree>
     <p:extLst>
       <p:ext uri="{BB962C8B-B14F-4D97-AF65-F5344CB8AC3E}">
-        <p14:creationId xmlns:p14="http://schemas.microsoft.com/office/powerpoint/2010/main" val="2177739259"/>
+        <p14:creationId xmlns:p14="http://schemas.microsoft.com/office/powerpoint/2010/main" val="3610968008"/>
       </p:ext>
     </p:extLst>
   </p:cSld>
   <p:clrMap bg1="lt1" tx1="dk1" bg2="lt2" tx2="dk2" accent1="accent1" accent2="accent2" accent3="accent3" accent4="accent4" accent5="accent5" accent6="accent6" hlink="hlink" folHlink="folHlink"/>
   <p:sldLayoutIdLst>
-    <p:sldLayoutId id="2147483661" r:id="rId1"/>
-    <p:sldLayoutId id="2147483662" r:id="rId2"/>
-    <p:sldLayoutId id="2147483663" r:id="rId3"/>
-    <p:sldLayoutId id="2147483664" r:id="rId4"/>
-    <p:sldLayoutId id="2147483665" r:id="rId5"/>
-    <p:sldLayoutId id="2147483666" r:id="rId6"/>
-    <p:sldLayoutId id="2147483667" r:id="rId7"/>
-    <p:sldLayoutId id="2147483668" r:id="rId8"/>
-    <p:sldLayoutId id="2147483669" r:id="rId9"/>
-    <p:sldLayoutId id="2147483670" r:id="rId10"/>
-    <p:sldLayoutId id="2147483671" r:id="rId11"/>
+    <p:sldLayoutId id="2147483673" r:id="rId1"/>
+    <p:sldLayoutId id="2147483674" r:id="rId2"/>
+    <p:sldLayoutId id="2147483675" r:id="rId3"/>
+    <p:sldLayoutId id="2147483676" r:id="rId4"/>
+    <p:sldLayoutId id="2147483677" r:id="rId5"/>
+    <p:sldLayoutId id="2147483678" r:id="rId6"/>
+    <p:sldLayoutId id="2147483679" r:id="rId7"/>
+    <p:sldLayoutId id="2147483680" r:id="rId8"/>
+    <p:sldLayoutId id="2147483681" r:id="rId9"/>
+    <p:sldLayoutId id="2147483682" r:id="rId10"/>
+    <p:sldLayoutId id="2147483683" r:id="rId11"/>
   </p:sldLayoutIdLst>
   <p:txStyles>
     <p:titleStyle>
@@ -2992,49 +2996,12 @@
           <a:chExt cx="0" cy="0"/>
         </a:xfrm>
       </p:grpSpPr>
-      <p:sp>
-        <p:nvSpPr>
-          <p:cNvPr id="7" name="Title 6">
-            <a:extLst>
-              <a:ext uri="{FF2B5EF4-FFF2-40B4-BE49-F238E27FC236}">
-                <a16:creationId xmlns:a16="http://schemas.microsoft.com/office/drawing/2014/main" id="{DCF1180C-D67F-8A59-FCFE-A4F64F45CBAA}"/>
-              </a:ext>
-            </a:extLst>
-          </p:cNvPr>
-          <p:cNvSpPr>
-            <a:spLocks noGrp="1"/>
-          </p:cNvSpPr>
-          <p:nvPr>
-            <p:ph type="title"/>
-          </p:nvPr>
-        </p:nvSpPr>
-        <p:spPr>
-          <a:xfrm>
-            <a:off x="754380" y="0"/>
-            <a:ext cx="9464040" cy="3534835"/>
-          </a:xfrm>
-        </p:spPr>
-        <p:txBody>
-          <a:bodyPr/>
-          <a:lstStyle/>
-          <a:p>
-            <a:r>
-              <a:rPr lang="en-US" dirty="0" err="1"/>
-              <a:t>Alpha_W</a:t>
-            </a:r>
-            <a:r>
-              <a:rPr lang="en-US" dirty="0"/>
-              <a:t> = 3456</a:t>
-            </a:r>
-          </a:p>
-        </p:txBody>
-      </p:sp>
       <p:pic>
         <p:nvPicPr>
           <p:cNvPr id="3" name="Picture 2" descr="A graph of a graph&#10;&#10;Description automatically generated with medium confidence">
             <a:extLst>
               <a:ext uri="{FF2B5EF4-FFF2-40B4-BE49-F238E27FC236}">
-                <a16:creationId xmlns:a16="http://schemas.microsoft.com/office/drawing/2014/main" id="{34AC9515-303C-36CA-C64B-CE16BE43A5A2}"/>
+                <a16:creationId xmlns:a16="http://schemas.microsoft.com/office/drawing/2014/main" id="{0C6186E0-91CE-1CE7-2EA6-7C57B6C85170}"/>
               </a:ext>
             </a:extLst>
           </p:cNvPr>
@@ -3051,8 +3018,8 @@
         </p:blipFill>
         <p:spPr>
           <a:xfrm>
-            <a:off x="377952" y="2962656"/>
-            <a:ext cx="10216896" cy="15325344"/>
+            <a:off x="0" y="0"/>
+            <a:ext cx="10972800" cy="16459200"/>
           </a:xfrm>
           <a:prstGeom prst="rect">
             <a:avLst/>
@@ -3062,7 +3029,7 @@
     </p:spTree>
     <p:extLst>
       <p:ext uri="{BB962C8B-B14F-4D97-AF65-F5344CB8AC3E}">
-        <p14:creationId xmlns:p14="http://schemas.microsoft.com/office/powerpoint/2010/main" val="4151379149"/>
+        <p14:creationId xmlns:p14="http://schemas.microsoft.com/office/powerpoint/2010/main" val="623542138"/>
       </p:ext>
     </p:extLst>
   </p:cSld>
@@ -3072,18 +3039,12 @@
 </p:sld>
 </file>
 
-<file path=ppt/slides/slide2.xml><?xml version="1.0" encoding="utf-8"?>
+<file path=ppt/slides/slide10.xml><?xml version="1.0" encoding="utf-8"?>
 <p:sld xmlns:a="http://schemas.openxmlformats.org/drawingml/2006/main" xmlns:r="http://schemas.openxmlformats.org/officeDocument/2006/relationships" xmlns:p="http://schemas.openxmlformats.org/presentationml/2006/main">
   <p:cSld>
     <p:spTree>
       <p:nvGrpSpPr>
-        <p:cNvPr id="1" name="">
-          <a:extLst>
-            <a:ext uri="{FF2B5EF4-FFF2-40B4-BE49-F238E27FC236}">
-              <a16:creationId xmlns:a16="http://schemas.microsoft.com/office/drawing/2014/main" id="{4AE7C1C5-8118-0CC9-0A18-57C3C455ED42}"/>
-            </a:ext>
-          </a:extLst>
-        </p:cNvPr>
+        <p:cNvPr id="1" name=""/>
         <p:cNvGrpSpPr/>
         <p:nvPr/>
       </p:nvGrpSpPr>
@@ -3095,49 +3056,12 @@
           <a:chExt cx="0" cy="0"/>
         </a:xfrm>
       </p:grpSpPr>
-      <p:sp>
-        <p:nvSpPr>
-          <p:cNvPr id="7" name="Title 6">
+      <p:pic>
+        <p:nvPicPr>
+          <p:cNvPr id="3" name="Picture 2" descr="A graph of a graph&#10;&#10;Description automatically generated with medium confidence">
             <a:extLst>
               <a:ext uri="{FF2B5EF4-FFF2-40B4-BE49-F238E27FC236}">
-                <a16:creationId xmlns:a16="http://schemas.microsoft.com/office/drawing/2014/main" id="{F0D0995F-B8F0-F621-C263-5C10F9A0047D}"/>
-              </a:ext>
-            </a:extLst>
-          </p:cNvPr>
-          <p:cNvSpPr>
-            <a:spLocks noGrp="1"/>
-          </p:cNvSpPr>
-          <p:nvPr>
-            <p:ph type="title"/>
-          </p:nvPr>
-        </p:nvSpPr>
-        <p:spPr>
-          <a:xfrm>
-            <a:off x="754380" y="0"/>
-            <a:ext cx="9464040" cy="3534835"/>
-          </a:xfrm>
-        </p:spPr>
-        <p:txBody>
-          <a:bodyPr/>
-          <a:lstStyle/>
-          <a:p>
-            <a:r>
-              <a:rPr lang="en-US" dirty="0" err="1"/>
-              <a:t>Alpha_W</a:t>
-            </a:r>
-            <a:r>
-              <a:rPr lang="en-US" dirty="0"/>
-              <a:t> = 1728</a:t>
-            </a:r>
-          </a:p>
-        </p:txBody>
-      </p:sp>
-      <p:pic>
-        <p:nvPicPr>
-          <p:cNvPr id="4" name="Picture 3" descr="A graph of a graph&#10;&#10;Description automatically generated with medium confidence">
-            <a:extLst>
-              <a:ext uri="{FF2B5EF4-FFF2-40B4-BE49-F238E27FC236}">
-                <a16:creationId xmlns:a16="http://schemas.microsoft.com/office/drawing/2014/main" id="{33710396-190A-171A-193B-0896E5914CFD}"/>
+                <a16:creationId xmlns:a16="http://schemas.microsoft.com/office/drawing/2014/main" id="{ED06FD15-EA18-ACD9-3F56-FE4A046E967C}"/>
               </a:ext>
             </a:extLst>
           </p:cNvPr>
@@ -3154,8 +3078,8 @@
         </p:blipFill>
         <p:spPr>
           <a:xfrm>
-            <a:off x="377952" y="2962656"/>
-            <a:ext cx="10216896" cy="15325344"/>
+            <a:off x="0" y="0"/>
+            <a:ext cx="10972800" cy="16459200"/>
           </a:xfrm>
           <a:prstGeom prst="rect">
             <a:avLst/>
@@ -3165,7 +3089,7 @@
     </p:spTree>
     <p:extLst>
       <p:ext uri="{BB962C8B-B14F-4D97-AF65-F5344CB8AC3E}">
-        <p14:creationId xmlns:p14="http://schemas.microsoft.com/office/powerpoint/2010/main" val="324119860"/>
+        <p14:creationId xmlns:p14="http://schemas.microsoft.com/office/powerpoint/2010/main" val="4081455793"/>
       </p:ext>
     </p:extLst>
   </p:cSld>
@@ -3175,18 +3099,12 @@
 </p:sld>
 </file>
 
-<file path=ppt/slides/slide3.xml><?xml version="1.0" encoding="utf-8"?>
+<file path=ppt/slides/slide11.xml><?xml version="1.0" encoding="utf-8"?>
 <p:sld xmlns:a="http://schemas.openxmlformats.org/drawingml/2006/main" xmlns:r="http://schemas.openxmlformats.org/officeDocument/2006/relationships" xmlns:p="http://schemas.openxmlformats.org/presentationml/2006/main">
   <p:cSld>
     <p:spTree>
       <p:nvGrpSpPr>
-        <p:cNvPr id="1" name="">
-          <a:extLst>
-            <a:ext uri="{FF2B5EF4-FFF2-40B4-BE49-F238E27FC236}">
-              <a16:creationId xmlns:a16="http://schemas.microsoft.com/office/drawing/2014/main" id="{F4FCFA24-FB57-6D70-DEFB-CF4AEB840D19}"/>
-            </a:ext>
-          </a:extLst>
-        </p:cNvPr>
+        <p:cNvPr id="1" name=""/>
         <p:cNvGrpSpPr/>
         <p:nvPr/>
       </p:nvGrpSpPr>
@@ -3198,49 +3116,12 @@
           <a:chExt cx="0" cy="0"/>
         </a:xfrm>
       </p:grpSpPr>
-      <p:sp>
-        <p:nvSpPr>
-          <p:cNvPr id="7" name="Title 6">
+      <p:pic>
+        <p:nvPicPr>
+          <p:cNvPr id="3" name="Picture 2" descr="A graph of a graph&#10;&#10;Description automatically generated with medium confidence">
             <a:extLst>
               <a:ext uri="{FF2B5EF4-FFF2-40B4-BE49-F238E27FC236}">
-                <a16:creationId xmlns:a16="http://schemas.microsoft.com/office/drawing/2014/main" id="{102FE1B0-CFC1-538C-3052-84DC3309C5CC}"/>
-              </a:ext>
-            </a:extLst>
-          </p:cNvPr>
-          <p:cNvSpPr>
-            <a:spLocks noGrp="1"/>
-          </p:cNvSpPr>
-          <p:nvPr>
-            <p:ph type="title"/>
-          </p:nvPr>
-        </p:nvSpPr>
-        <p:spPr>
-          <a:xfrm>
-            <a:off x="754380" y="0"/>
-            <a:ext cx="9464040" cy="3534835"/>
-          </a:xfrm>
-        </p:spPr>
-        <p:txBody>
-          <a:bodyPr/>
-          <a:lstStyle/>
-          <a:p>
-            <a:r>
-              <a:rPr lang="en-US" dirty="0" err="1"/>
-              <a:t>Alpha_W</a:t>
-            </a:r>
-            <a:r>
-              <a:rPr lang="en-US" dirty="0"/>
-              <a:t> = 864</a:t>
-            </a:r>
-          </a:p>
-        </p:txBody>
-      </p:sp>
-      <p:pic>
-        <p:nvPicPr>
-          <p:cNvPr id="4" name="Picture 3" descr="A graph of a graph&#10;&#10;Description automatically generated with medium confidence">
-            <a:extLst>
-              <a:ext uri="{FF2B5EF4-FFF2-40B4-BE49-F238E27FC236}">
-                <a16:creationId xmlns:a16="http://schemas.microsoft.com/office/drawing/2014/main" id="{24BC6848-4DE5-EA04-F197-95B68A3BB6F5}"/>
+                <a16:creationId xmlns:a16="http://schemas.microsoft.com/office/drawing/2014/main" id="{0A3BCE37-BDA5-A32E-30FC-F36EFAC26981}"/>
               </a:ext>
             </a:extLst>
           </p:cNvPr>
@@ -3257,8 +3138,8 @@
         </p:blipFill>
         <p:spPr>
           <a:xfrm>
-            <a:off x="377952" y="2962656"/>
-            <a:ext cx="10216896" cy="15325344"/>
+            <a:off x="0" y="0"/>
+            <a:ext cx="10972800" cy="16459200"/>
           </a:xfrm>
           <a:prstGeom prst="rect">
             <a:avLst/>
@@ -3268,7 +3149,7 @@
     </p:spTree>
     <p:extLst>
       <p:ext uri="{BB962C8B-B14F-4D97-AF65-F5344CB8AC3E}">
-        <p14:creationId xmlns:p14="http://schemas.microsoft.com/office/powerpoint/2010/main" val="1980686672"/>
+        <p14:creationId xmlns:p14="http://schemas.microsoft.com/office/powerpoint/2010/main" val="615332090"/>
       </p:ext>
     </p:extLst>
   </p:cSld>
@@ -3278,18 +3159,12 @@
 </p:sld>
 </file>
 
-<file path=ppt/slides/slide4.xml><?xml version="1.0" encoding="utf-8"?>
+<file path=ppt/slides/slide12.xml><?xml version="1.0" encoding="utf-8"?>
 <p:sld xmlns:a="http://schemas.openxmlformats.org/drawingml/2006/main" xmlns:r="http://schemas.openxmlformats.org/officeDocument/2006/relationships" xmlns:p="http://schemas.openxmlformats.org/presentationml/2006/main">
   <p:cSld>
     <p:spTree>
       <p:nvGrpSpPr>
-        <p:cNvPr id="1" name="">
-          <a:extLst>
-            <a:ext uri="{FF2B5EF4-FFF2-40B4-BE49-F238E27FC236}">
-              <a16:creationId xmlns:a16="http://schemas.microsoft.com/office/drawing/2014/main" id="{01949F2A-6EE9-D19C-911E-D6E47A2D5B4D}"/>
-            </a:ext>
-          </a:extLst>
-        </p:cNvPr>
+        <p:cNvPr id="1" name=""/>
         <p:cNvGrpSpPr/>
         <p:nvPr/>
       </p:nvGrpSpPr>
@@ -3301,49 +3176,12 @@
           <a:chExt cx="0" cy="0"/>
         </a:xfrm>
       </p:grpSpPr>
-      <p:sp>
-        <p:nvSpPr>
-          <p:cNvPr id="7" name="Title 6">
+      <p:pic>
+        <p:nvPicPr>
+          <p:cNvPr id="3" name="Picture 2" descr="A graph of a graph&#10;&#10;Description automatically generated with medium confidence">
             <a:extLst>
               <a:ext uri="{FF2B5EF4-FFF2-40B4-BE49-F238E27FC236}">
-                <a16:creationId xmlns:a16="http://schemas.microsoft.com/office/drawing/2014/main" id="{0AC4BD60-3968-99D9-23BA-A89581864F3E}"/>
-              </a:ext>
-            </a:extLst>
-          </p:cNvPr>
-          <p:cNvSpPr>
-            <a:spLocks noGrp="1"/>
-          </p:cNvSpPr>
-          <p:nvPr>
-            <p:ph type="title"/>
-          </p:nvPr>
-        </p:nvSpPr>
-        <p:spPr>
-          <a:xfrm>
-            <a:off x="754380" y="0"/>
-            <a:ext cx="9464040" cy="3534835"/>
-          </a:xfrm>
-        </p:spPr>
-        <p:txBody>
-          <a:bodyPr/>
-          <a:lstStyle/>
-          <a:p>
-            <a:r>
-              <a:rPr lang="en-US" dirty="0" err="1"/>
-              <a:t>Alpha_W</a:t>
-            </a:r>
-            <a:r>
-              <a:rPr lang="en-US" dirty="0"/>
-              <a:t> = 432</a:t>
-            </a:r>
-          </a:p>
-        </p:txBody>
-      </p:sp>
-      <p:pic>
-        <p:nvPicPr>
-          <p:cNvPr id="4" name="Picture 3" descr="A graph of a graph&#10;&#10;Description automatically generated">
-            <a:extLst>
-              <a:ext uri="{FF2B5EF4-FFF2-40B4-BE49-F238E27FC236}">
-                <a16:creationId xmlns:a16="http://schemas.microsoft.com/office/drawing/2014/main" id="{E64BC6C9-3CCE-6E7E-FA2F-746433D6A6A1}"/>
+                <a16:creationId xmlns:a16="http://schemas.microsoft.com/office/drawing/2014/main" id="{0A38FEA4-AD74-81DB-7E41-663ED1CFE7F3}"/>
               </a:ext>
             </a:extLst>
           </p:cNvPr>
@@ -3360,8 +3198,8 @@
         </p:blipFill>
         <p:spPr>
           <a:xfrm>
-            <a:off x="377952" y="2962656"/>
-            <a:ext cx="10216896" cy="15325344"/>
+            <a:off x="0" y="0"/>
+            <a:ext cx="10972800" cy="16459200"/>
           </a:xfrm>
           <a:prstGeom prst="rect">
             <a:avLst/>
@@ -3371,7 +3209,7 @@
     </p:spTree>
     <p:extLst>
       <p:ext uri="{BB962C8B-B14F-4D97-AF65-F5344CB8AC3E}">
-        <p14:creationId xmlns:p14="http://schemas.microsoft.com/office/powerpoint/2010/main" val="298324884"/>
+        <p14:creationId xmlns:p14="http://schemas.microsoft.com/office/powerpoint/2010/main" val="475091747"/>
       </p:ext>
     </p:extLst>
   </p:cSld>
@@ -3381,18 +3219,12 @@
 </p:sld>
 </file>
 
-<file path=ppt/slides/slide5.xml><?xml version="1.0" encoding="utf-8"?>
+<file path=ppt/slides/slide13.xml><?xml version="1.0" encoding="utf-8"?>
 <p:sld xmlns:a="http://schemas.openxmlformats.org/drawingml/2006/main" xmlns:r="http://schemas.openxmlformats.org/officeDocument/2006/relationships" xmlns:p="http://schemas.openxmlformats.org/presentationml/2006/main">
   <p:cSld>
     <p:spTree>
       <p:nvGrpSpPr>
-        <p:cNvPr id="1" name="">
-          <a:extLst>
-            <a:ext uri="{FF2B5EF4-FFF2-40B4-BE49-F238E27FC236}">
-              <a16:creationId xmlns:a16="http://schemas.microsoft.com/office/drawing/2014/main" id="{18289FA5-4198-6D9B-4063-EC7FFEB27BB5}"/>
-            </a:ext>
-          </a:extLst>
-        </p:cNvPr>
+        <p:cNvPr id="1" name=""/>
         <p:cNvGrpSpPr/>
         <p:nvPr/>
       </p:nvGrpSpPr>
@@ -3404,49 +3236,12 @@
           <a:chExt cx="0" cy="0"/>
         </a:xfrm>
       </p:grpSpPr>
-      <p:sp>
-        <p:nvSpPr>
-          <p:cNvPr id="7" name="Title 6">
+      <p:pic>
+        <p:nvPicPr>
+          <p:cNvPr id="3" name="Picture 2" descr="A graph of a graph&#10;&#10;Description automatically generated with medium confidence">
             <a:extLst>
               <a:ext uri="{FF2B5EF4-FFF2-40B4-BE49-F238E27FC236}">
-                <a16:creationId xmlns:a16="http://schemas.microsoft.com/office/drawing/2014/main" id="{DF7FA4C2-6BB5-0F15-34E1-940CD2218B4A}"/>
-              </a:ext>
-            </a:extLst>
-          </p:cNvPr>
-          <p:cNvSpPr>
-            <a:spLocks noGrp="1"/>
-          </p:cNvSpPr>
-          <p:nvPr>
-            <p:ph type="title"/>
-          </p:nvPr>
-        </p:nvSpPr>
-        <p:spPr>
-          <a:xfrm>
-            <a:off x="754380" y="0"/>
-            <a:ext cx="9464040" cy="3534835"/>
-          </a:xfrm>
-        </p:spPr>
-        <p:txBody>
-          <a:bodyPr/>
-          <a:lstStyle/>
-          <a:p>
-            <a:r>
-              <a:rPr lang="en-US" dirty="0" err="1"/>
-              <a:t>Alpha_W</a:t>
-            </a:r>
-            <a:r>
-              <a:rPr lang="en-US" dirty="0"/>
-              <a:t> = 216</a:t>
-            </a:r>
-          </a:p>
-        </p:txBody>
-      </p:sp>
-      <p:pic>
-        <p:nvPicPr>
-          <p:cNvPr id="4" name="Picture 3" descr="A graph of a graph&#10;&#10;Description automatically generated">
-            <a:extLst>
-              <a:ext uri="{FF2B5EF4-FFF2-40B4-BE49-F238E27FC236}">
-                <a16:creationId xmlns:a16="http://schemas.microsoft.com/office/drawing/2014/main" id="{AA9BCC16-EC0D-1D6F-F977-253AD2E5A4D4}"/>
+                <a16:creationId xmlns:a16="http://schemas.microsoft.com/office/drawing/2014/main" id="{EF85DAB7-A686-CAB8-A2C0-D8303162733C}"/>
               </a:ext>
             </a:extLst>
           </p:cNvPr>
@@ -3463,8 +3258,8 @@
         </p:blipFill>
         <p:spPr>
           <a:xfrm>
-            <a:off x="377952" y="2962656"/>
-            <a:ext cx="10216896" cy="15325344"/>
+            <a:off x="0" y="0"/>
+            <a:ext cx="10972800" cy="16459200"/>
           </a:xfrm>
           <a:prstGeom prst="rect">
             <a:avLst/>
@@ -3474,7 +3269,7 @@
     </p:spTree>
     <p:extLst>
       <p:ext uri="{BB962C8B-B14F-4D97-AF65-F5344CB8AC3E}">
-        <p14:creationId xmlns:p14="http://schemas.microsoft.com/office/powerpoint/2010/main" val="386539980"/>
+        <p14:creationId xmlns:p14="http://schemas.microsoft.com/office/powerpoint/2010/main" val="3365978407"/>
       </p:ext>
     </p:extLst>
   </p:cSld>
@@ -3484,18 +3279,12 @@
 </p:sld>
 </file>
 
-<file path=ppt/slides/slide6.xml><?xml version="1.0" encoding="utf-8"?>
+<file path=ppt/slides/slide2.xml><?xml version="1.0" encoding="utf-8"?>
 <p:sld xmlns:a="http://schemas.openxmlformats.org/drawingml/2006/main" xmlns:r="http://schemas.openxmlformats.org/officeDocument/2006/relationships" xmlns:p="http://schemas.openxmlformats.org/presentationml/2006/main">
   <p:cSld>
     <p:spTree>
       <p:nvGrpSpPr>
-        <p:cNvPr id="1" name="">
-          <a:extLst>
-            <a:ext uri="{FF2B5EF4-FFF2-40B4-BE49-F238E27FC236}">
-              <a16:creationId xmlns:a16="http://schemas.microsoft.com/office/drawing/2014/main" id="{5EF68657-4FCD-7D35-CDCF-75B736972C67}"/>
-            </a:ext>
-          </a:extLst>
-        </p:cNvPr>
+        <p:cNvPr id="1" name=""/>
         <p:cNvGrpSpPr/>
         <p:nvPr/>
       </p:nvGrpSpPr>
@@ -3507,49 +3296,12 @@
           <a:chExt cx="0" cy="0"/>
         </a:xfrm>
       </p:grpSpPr>
-      <p:sp>
-        <p:nvSpPr>
-          <p:cNvPr id="7" name="Title 6">
+      <p:pic>
+        <p:nvPicPr>
+          <p:cNvPr id="3" name="Picture 2" descr="A graph of a graph&#10;&#10;Description automatically generated with medium confidence">
             <a:extLst>
               <a:ext uri="{FF2B5EF4-FFF2-40B4-BE49-F238E27FC236}">
-                <a16:creationId xmlns:a16="http://schemas.microsoft.com/office/drawing/2014/main" id="{3A17C25E-781D-A4EC-D126-9A104369CC07}"/>
-              </a:ext>
-            </a:extLst>
-          </p:cNvPr>
-          <p:cNvSpPr>
-            <a:spLocks noGrp="1"/>
-          </p:cNvSpPr>
-          <p:nvPr>
-            <p:ph type="title"/>
-          </p:nvPr>
-        </p:nvSpPr>
-        <p:spPr>
-          <a:xfrm>
-            <a:off x="754380" y="0"/>
-            <a:ext cx="9464040" cy="3534835"/>
-          </a:xfrm>
-        </p:spPr>
-        <p:txBody>
-          <a:bodyPr/>
-          <a:lstStyle/>
-          <a:p>
-            <a:r>
-              <a:rPr lang="en-US" dirty="0" err="1"/>
-              <a:t>Alpha_W</a:t>
-            </a:r>
-            <a:r>
-              <a:rPr lang="en-US" dirty="0"/>
-              <a:t> = 108</a:t>
-            </a:r>
-          </a:p>
-        </p:txBody>
-      </p:sp>
-      <p:pic>
-        <p:nvPicPr>
-          <p:cNvPr id="4" name="Picture 3" descr="A graph of a graph&#10;&#10;Description automatically generated">
-            <a:extLst>
-              <a:ext uri="{FF2B5EF4-FFF2-40B4-BE49-F238E27FC236}">
-                <a16:creationId xmlns:a16="http://schemas.microsoft.com/office/drawing/2014/main" id="{D5FBEEBB-0DB3-A617-AC2A-9D13B9C5B499}"/>
+                <a16:creationId xmlns:a16="http://schemas.microsoft.com/office/drawing/2014/main" id="{1C320215-4143-C78B-3976-64A92BF91300}"/>
               </a:ext>
             </a:extLst>
           </p:cNvPr>
@@ -3566,8 +3318,8 @@
         </p:blipFill>
         <p:spPr>
           <a:xfrm>
-            <a:off x="377952" y="2962656"/>
-            <a:ext cx="10216896" cy="15325344"/>
+            <a:off x="0" y="0"/>
+            <a:ext cx="10972800" cy="16459200"/>
           </a:xfrm>
           <a:prstGeom prst="rect">
             <a:avLst/>
@@ -3577,7 +3329,7 @@
     </p:spTree>
     <p:extLst>
       <p:ext uri="{BB962C8B-B14F-4D97-AF65-F5344CB8AC3E}">
-        <p14:creationId xmlns:p14="http://schemas.microsoft.com/office/powerpoint/2010/main" val="1887654429"/>
+        <p14:creationId xmlns:p14="http://schemas.microsoft.com/office/powerpoint/2010/main" val="3704713895"/>
       </p:ext>
     </p:extLst>
   </p:cSld>
@@ -3587,18 +3339,12 @@
 </p:sld>
 </file>
 
-<file path=ppt/slides/slide7.xml><?xml version="1.0" encoding="utf-8"?>
+<file path=ppt/slides/slide3.xml><?xml version="1.0" encoding="utf-8"?>
 <p:sld xmlns:a="http://schemas.openxmlformats.org/drawingml/2006/main" xmlns:r="http://schemas.openxmlformats.org/officeDocument/2006/relationships" xmlns:p="http://schemas.openxmlformats.org/presentationml/2006/main">
   <p:cSld>
     <p:spTree>
       <p:nvGrpSpPr>
-        <p:cNvPr id="1" name="">
-          <a:extLst>
-            <a:ext uri="{FF2B5EF4-FFF2-40B4-BE49-F238E27FC236}">
-              <a16:creationId xmlns:a16="http://schemas.microsoft.com/office/drawing/2014/main" id="{FB8E9FA6-41E7-D5AE-FD56-252E3756B058}"/>
-            </a:ext>
-          </a:extLst>
-        </p:cNvPr>
+        <p:cNvPr id="1" name=""/>
         <p:cNvGrpSpPr/>
         <p:nvPr/>
       </p:nvGrpSpPr>
@@ -3610,49 +3356,12 @@
           <a:chExt cx="0" cy="0"/>
         </a:xfrm>
       </p:grpSpPr>
-      <p:sp>
-        <p:nvSpPr>
-          <p:cNvPr id="7" name="Title 6">
+      <p:pic>
+        <p:nvPicPr>
+          <p:cNvPr id="3" name="Picture 2" descr="A graph of a graph&#10;&#10;Description automatically generated with medium confidence">
             <a:extLst>
               <a:ext uri="{FF2B5EF4-FFF2-40B4-BE49-F238E27FC236}">
-                <a16:creationId xmlns:a16="http://schemas.microsoft.com/office/drawing/2014/main" id="{3A4A1D40-04D0-F7BE-B683-FC133A905BFB}"/>
-              </a:ext>
-            </a:extLst>
-          </p:cNvPr>
-          <p:cNvSpPr>
-            <a:spLocks noGrp="1"/>
-          </p:cNvSpPr>
-          <p:nvPr>
-            <p:ph type="title"/>
-          </p:nvPr>
-        </p:nvSpPr>
-        <p:spPr>
-          <a:xfrm>
-            <a:off x="754380" y="0"/>
-            <a:ext cx="9464040" cy="3534835"/>
-          </a:xfrm>
-        </p:spPr>
-        <p:txBody>
-          <a:bodyPr/>
-          <a:lstStyle/>
-          <a:p>
-            <a:r>
-              <a:rPr lang="en-US" dirty="0" err="1"/>
-              <a:t>Alpha_W</a:t>
-            </a:r>
-            <a:r>
-              <a:rPr lang="en-US" dirty="0"/>
-              <a:t> = 54</a:t>
-            </a:r>
-          </a:p>
-        </p:txBody>
-      </p:sp>
-      <p:pic>
-        <p:nvPicPr>
-          <p:cNvPr id="4" name="Picture 3" descr="A graph of a graph&#10;&#10;Description automatically generated with medium confidence">
-            <a:extLst>
-              <a:ext uri="{FF2B5EF4-FFF2-40B4-BE49-F238E27FC236}">
-                <a16:creationId xmlns:a16="http://schemas.microsoft.com/office/drawing/2014/main" id="{9210335A-8C94-072F-CEBC-90E8EFDAEA3A}"/>
+                <a16:creationId xmlns:a16="http://schemas.microsoft.com/office/drawing/2014/main" id="{39BEA6D5-6496-74F4-E103-B0318636C731}"/>
               </a:ext>
             </a:extLst>
           </p:cNvPr>
@@ -3669,8 +3378,8 @@
         </p:blipFill>
         <p:spPr>
           <a:xfrm>
-            <a:off x="377952" y="2962656"/>
-            <a:ext cx="10216896" cy="15325344"/>
+            <a:off x="0" y="0"/>
+            <a:ext cx="10972800" cy="16459200"/>
           </a:xfrm>
           <a:prstGeom prst="rect">
             <a:avLst/>
@@ -3680,7 +3389,7 @@
     </p:spTree>
     <p:extLst>
       <p:ext uri="{BB962C8B-B14F-4D97-AF65-F5344CB8AC3E}">
-        <p14:creationId xmlns:p14="http://schemas.microsoft.com/office/powerpoint/2010/main" val="1809882167"/>
+        <p14:creationId xmlns:p14="http://schemas.microsoft.com/office/powerpoint/2010/main" val="1146114630"/>
       </p:ext>
     </p:extLst>
   </p:cSld>
@@ -3690,18 +3399,12 @@
 </p:sld>
 </file>
 
-<file path=ppt/slides/slide8.xml><?xml version="1.0" encoding="utf-8"?>
+<file path=ppt/slides/slide4.xml><?xml version="1.0" encoding="utf-8"?>
 <p:sld xmlns:a="http://schemas.openxmlformats.org/drawingml/2006/main" xmlns:r="http://schemas.openxmlformats.org/officeDocument/2006/relationships" xmlns:p="http://schemas.openxmlformats.org/presentationml/2006/main">
   <p:cSld>
     <p:spTree>
       <p:nvGrpSpPr>
-        <p:cNvPr id="1" name="">
-          <a:extLst>
-            <a:ext uri="{FF2B5EF4-FFF2-40B4-BE49-F238E27FC236}">
-              <a16:creationId xmlns:a16="http://schemas.microsoft.com/office/drawing/2014/main" id="{D25565D9-3F34-4CE0-4889-C3CE6ED537EE}"/>
-            </a:ext>
-          </a:extLst>
-        </p:cNvPr>
+        <p:cNvPr id="1" name=""/>
         <p:cNvGrpSpPr/>
         <p:nvPr/>
       </p:nvGrpSpPr>
@@ -3713,49 +3416,12 @@
           <a:chExt cx="0" cy="0"/>
         </a:xfrm>
       </p:grpSpPr>
-      <p:sp>
-        <p:nvSpPr>
-          <p:cNvPr id="7" name="Title 6">
+      <p:pic>
+        <p:nvPicPr>
+          <p:cNvPr id="3" name="Picture 2" descr="A graph paper with numbers and lines&#10;&#10;Description automatically generated with medium confidence">
             <a:extLst>
               <a:ext uri="{FF2B5EF4-FFF2-40B4-BE49-F238E27FC236}">
-                <a16:creationId xmlns:a16="http://schemas.microsoft.com/office/drawing/2014/main" id="{949106C5-7781-8D79-32DF-6A5897F9B27C}"/>
-              </a:ext>
-            </a:extLst>
-          </p:cNvPr>
-          <p:cNvSpPr>
-            <a:spLocks noGrp="1"/>
-          </p:cNvSpPr>
-          <p:nvPr>
-            <p:ph type="title"/>
-          </p:nvPr>
-        </p:nvSpPr>
-        <p:spPr>
-          <a:xfrm>
-            <a:off x="754380" y="0"/>
-            <a:ext cx="9464040" cy="3534835"/>
-          </a:xfrm>
-        </p:spPr>
-        <p:txBody>
-          <a:bodyPr/>
-          <a:lstStyle/>
-          <a:p>
-            <a:r>
-              <a:rPr lang="en-US" dirty="0" err="1"/>
-              <a:t>Alpha_W</a:t>
-            </a:r>
-            <a:r>
-              <a:rPr lang="en-US" dirty="0"/>
-              <a:t> = 27</a:t>
-            </a:r>
-          </a:p>
-        </p:txBody>
-      </p:sp>
-      <p:pic>
-        <p:nvPicPr>
-          <p:cNvPr id="4" name="Picture 3" descr="A graph of a function&#10;&#10;Description automatically generated">
-            <a:extLst>
-              <a:ext uri="{FF2B5EF4-FFF2-40B4-BE49-F238E27FC236}">
-                <a16:creationId xmlns:a16="http://schemas.microsoft.com/office/drawing/2014/main" id="{47157F4C-8DC6-E5E5-0F84-E9AD0B825833}"/>
+                <a16:creationId xmlns:a16="http://schemas.microsoft.com/office/drawing/2014/main" id="{7D647EDB-0193-D209-FC50-2D3DBC0195BF}"/>
               </a:ext>
             </a:extLst>
           </p:cNvPr>
@@ -3772,8 +3438,8 @@
         </p:blipFill>
         <p:spPr>
           <a:xfrm>
-            <a:off x="377952" y="2962656"/>
-            <a:ext cx="10216896" cy="15325344"/>
+            <a:off x="0" y="0"/>
+            <a:ext cx="10972800" cy="16459200"/>
           </a:xfrm>
           <a:prstGeom prst="rect">
             <a:avLst/>
@@ -3783,7 +3449,7 @@
     </p:spTree>
     <p:extLst>
       <p:ext uri="{BB962C8B-B14F-4D97-AF65-F5344CB8AC3E}">
-        <p14:creationId xmlns:p14="http://schemas.microsoft.com/office/powerpoint/2010/main" val="1782744299"/>
+        <p14:creationId xmlns:p14="http://schemas.microsoft.com/office/powerpoint/2010/main" val="2691157975"/>
       </p:ext>
     </p:extLst>
   </p:cSld>
@@ -3793,18 +3459,12 @@
 </p:sld>
 </file>
 
-<file path=ppt/slides/slide9.xml><?xml version="1.0" encoding="utf-8"?>
+<file path=ppt/slides/slide5.xml><?xml version="1.0" encoding="utf-8"?>
 <p:sld xmlns:a="http://schemas.openxmlformats.org/drawingml/2006/main" xmlns:r="http://schemas.openxmlformats.org/officeDocument/2006/relationships" xmlns:p="http://schemas.openxmlformats.org/presentationml/2006/main">
   <p:cSld>
     <p:spTree>
       <p:nvGrpSpPr>
-        <p:cNvPr id="1" name="">
-          <a:extLst>
-            <a:ext uri="{FF2B5EF4-FFF2-40B4-BE49-F238E27FC236}">
-              <a16:creationId xmlns:a16="http://schemas.microsoft.com/office/drawing/2014/main" id="{FF5AAB6D-A035-1A62-2FAD-7A3ADF634027}"/>
-            </a:ext>
-          </a:extLst>
-        </p:cNvPr>
+        <p:cNvPr id="1" name=""/>
         <p:cNvGrpSpPr/>
         <p:nvPr/>
       </p:nvGrpSpPr>
@@ -3816,49 +3476,12 @@
           <a:chExt cx="0" cy="0"/>
         </a:xfrm>
       </p:grpSpPr>
-      <p:sp>
-        <p:nvSpPr>
-          <p:cNvPr id="7" name="Title 6">
+      <p:pic>
+        <p:nvPicPr>
+          <p:cNvPr id="3" name="Picture 2" descr="A graph paper with lines and numbers&#10;&#10;Description automatically generated">
             <a:extLst>
               <a:ext uri="{FF2B5EF4-FFF2-40B4-BE49-F238E27FC236}">
-                <a16:creationId xmlns:a16="http://schemas.microsoft.com/office/drawing/2014/main" id="{44D42672-F1D3-D3F0-F76D-ED8ECB568086}"/>
-              </a:ext>
-            </a:extLst>
-          </p:cNvPr>
-          <p:cNvSpPr>
-            <a:spLocks noGrp="1"/>
-          </p:cNvSpPr>
-          <p:nvPr>
-            <p:ph type="title"/>
-          </p:nvPr>
-        </p:nvSpPr>
-        <p:spPr>
-          <a:xfrm>
-            <a:off x="754380" y="0"/>
-            <a:ext cx="9464040" cy="3534835"/>
-          </a:xfrm>
-        </p:spPr>
-        <p:txBody>
-          <a:bodyPr/>
-          <a:lstStyle/>
-          <a:p>
-            <a:r>
-              <a:rPr lang="en-US" dirty="0" err="1"/>
-              <a:t>Alpha_W</a:t>
-            </a:r>
-            <a:r>
-              <a:rPr lang="en-US" dirty="0"/>
-              <a:t> = 13.5</a:t>
-            </a:r>
-          </a:p>
-        </p:txBody>
-      </p:sp>
-      <p:pic>
-        <p:nvPicPr>
-          <p:cNvPr id="4" name="Picture 3" descr="A graph of a graph&#10;&#10;Description automatically generated with medium confidence">
-            <a:extLst>
-              <a:ext uri="{FF2B5EF4-FFF2-40B4-BE49-F238E27FC236}">
-                <a16:creationId xmlns:a16="http://schemas.microsoft.com/office/drawing/2014/main" id="{21CF5CB6-B454-2A72-2501-5FCCAC3AA2D7}"/>
+                <a16:creationId xmlns:a16="http://schemas.microsoft.com/office/drawing/2014/main" id="{DF99AE17-5E6D-E973-1BB5-81137A269F34}"/>
               </a:ext>
             </a:extLst>
           </p:cNvPr>
@@ -3875,8 +3498,8 @@
         </p:blipFill>
         <p:spPr>
           <a:xfrm>
-            <a:off x="377952" y="2962656"/>
-            <a:ext cx="10216896" cy="15325344"/>
+            <a:off x="0" y="0"/>
+            <a:ext cx="10972800" cy="16459200"/>
           </a:xfrm>
           <a:prstGeom prst="rect">
             <a:avLst/>
@@ -3886,7 +3509,247 @@
     </p:spTree>
     <p:extLst>
       <p:ext uri="{BB962C8B-B14F-4D97-AF65-F5344CB8AC3E}">
-        <p14:creationId xmlns:p14="http://schemas.microsoft.com/office/powerpoint/2010/main" val="200928660"/>
+        <p14:creationId xmlns:p14="http://schemas.microsoft.com/office/powerpoint/2010/main" val="995573012"/>
+      </p:ext>
+    </p:extLst>
+  </p:cSld>
+  <p:clrMapOvr>
+    <a:masterClrMapping/>
+  </p:clrMapOvr>
+</p:sld>
+</file>
+
+<file path=ppt/slides/slide6.xml><?xml version="1.0" encoding="utf-8"?>
+<p:sld xmlns:a="http://schemas.openxmlformats.org/drawingml/2006/main" xmlns:r="http://schemas.openxmlformats.org/officeDocument/2006/relationships" xmlns:p="http://schemas.openxmlformats.org/presentationml/2006/main">
+  <p:cSld>
+    <p:spTree>
+      <p:nvGrpSpPr>
+        <p:cNvPr id="1" name=""/>
+        <p:cNvGrpSpPr/>
+        <p:nvPr/>
+      </p:nvGrpSpPr>
+      <p:grpSpPr>
+        <a:xfrm>
+          <a:off x="0" y="0"/>
+          <a:ext cx="0" cy="0"/>
+          <a:chOff x="0" y="0"/>
+          <a:chExt cx="0" cy="0"/>
+        </a:xfrm>
+      </p:grpSpPr>
+      <p:pic>
+        <p:nvPicPr>
+          <p:cNvPr id="3" name="Picture 2" descr="A graph of a graph&#10;&#10;Description automatically generated with medium confidence">
+            <a:extLst>
+              <a:ext uri="{FF2B5EF4-FFF2-40B4-BE49-F238E27FC236}">
+                <a16:creationId xmlns:a16="http://schemas.microsoft.com/office/drawing/2014/main" id="{FF67C0DC-C7C8-DE46-6B8F-BF14DC6AF4B4}"/>
+              </a:ext>
+            </a:extLst>
+          </p:cNvPr>
+          <p:cNvPicPr>
+            <a:picLocks noChangeAspect="1"/>
+          </p:cNvPicPr>
+          <p:nvPr/>
+        </p:nvPicPr>
+        <p:blipFill>
+          <a:blip r:embed="rId2"/>
+          <a:stretch>
+            <a:fillRect/>
+          </a:stretch>
+        </p:blipFill>
+        <p:spPr>
+          <a:xfrm>
+            <a:off x="0" y="0"/>
+            <a:ext cx="10972800" cy="16459200"/>
+          </a:xfrm>
+          <a:prstGeom prst="rect">
+            <a:avLst/>
+          </a:prstGeom>
+        </p:spPr>
+      </p:pic>
+    </p:spTree>
+    <p:extLst>
+      <p:ext uri="{BB962C8B-B14F-4D97-AF65-F5344CB8AC3E}">
+        <p14:creationId xmlns:p14="http://schemas.microsoft.com/office/powerpoint/2010/main" val="235484802"/>
+      </p:ext>
+    </p:extLst>
+  </p:cSld>
+  <p:clrMapOvr>
+    <a:masterClrMapping/>
+  </p:clrMapOvr>
+</p:sld>
+</file>
+
+<file path=ppt/slides/slide7.xml><?xml version="1.0" encoding="utf-8"?>
+<p:sld xmlns:a="http://schemas.openxmlformats.org/drawingml/2006/main" xmlns:r="http://schemas.openxmlformats.org/officeDocument/2006/relationships" xmlns:p="http://schemas.openxmlformats.org/presentationml/2006/main">
+  <p:cSld>
+    <p:spTree>
+      <p:nvGrpSpPr>
+        <p:cNvPr id="1" name=""/>
+        <p:cNvGrpSpPr/>
+        <p:nvPr/>
+      </p:nvGrpSpPr>
+      <p:grpSpPr>
+        <a:xfrm>
+          <a:off x="0" y="0"/>
+          <a:ext cx="0" cy="0"/>
+          <a:chOff x="0" y="0"/>
+          <a:chExt cx="0" cy="0"/>
+        </a:xfrm>
+      </p:grpSpPr>
+      <p:pic>
+        <p:nvPicPr>
+          <p:cNvPr id="3" name="Picture 2" descr="A graph of a graph&#10;&#10;Description automatically generated with medium confidence">
+            <a:extLst>
+              <a:ext uri="{FF2B5EF4-FFF2-40B4-BE49-F238E27FC236}">
+                <a16:creationId xmlns:a16="http://schemas.microsoft.com/office/drawing/2014/main" id="{A5FF0268-E20C-FB18-C62B-AFF3408681B8}"/>
+              </a:ext>
+            </a:extLst>
+          </p:cNvPr>
+          <p:cNvPicPr>
+            <a:picLocks noChangeAspect="1"/>
+          </p:cNvPicPr>
+          <p:nvPr/>
+        </p:nvPicPr>
+        <p:blipFill>
+          <a:blip r:embed="rId2"/>
+          <a:stretch>
+            <a:fillRect/>
+          </a:stretch>
+        </p:blipFill>
+        <p:spPr>
+          <a:xfrm>
+            <a:off x="0" y="0"/>
+            <a:ext cx="10972800" cy="16459200"/>
+          </a:xfrm>
+          <a:prstGeom prst="rect">
+            <a:avLst/>
+          </a:prstGeom>
+        </p:spPr>
+      </p:pic>
+    </p:spTree>
+    <p:extLst>
+      <p:ext uri="{BB962C8B-B14F-4D97-AF65-F5344CB8AC3E}">
+        <p14:creationId xmlns:p14="http://schemas.microsoft.com/office/powerpoint/2010/main" val="1457035958"/>
+      </p:ext>
+    </p:extLst>
+  </p:cSld>
+  <p:clrMapOvr>
+    <a:masterClrMapping/>
+  </p:clrMapOvr>
+</p:sld>
+</file>
+
+<file path=ppt/slides/slide8.xml><?xml version="1.0" encoding="utf-8"?>
+<p:sld xmlns:a="http://schemas.openxmlformats.org/drawingml/2006/main" xmlns:r="http://schemas.openxmlformats.org/officeDocument/2006/relationships" xmlns:p="http://schemas.openxmlformats.org/presentationml/2006/main">
+  <p:cSld>
+    <p:spTree>
+      <p:nvGrpSpPr>
+        <p:cNvPr id="1" name=""/>
+        <p:cNvGrpSpPr/>
+        <p:nvPr/>
+      </p:nvGrpSpPr>
+      <p:grpSpPr>
+        <a:xfrm>
+          <a:off x="0" y="0"/>
+          <a:ext cx="0" cy="0"/>
+          <a:chOff x="0" y="0"/>
+          <a:chExt cx="0" cy="0"/>
+        </a:xfrm>
+      </p:grpSpPr>
+      <p:pic>
+        <p:nvPicPr>
+          <p:cNvPr id="3" name="Picture 2" descr="A graph of a graph&#10;&#10;Description automatically generated">
+            <a:extLst>
+              <a:ext uri="{FF2B5EF4-FFF2-40B4-BE49-F238E27FC236}">
+                <a16:creationId xmlns:a16="http://schemas.microsoft.com/office/drawing/2014/main" id="{45AE73F6-78DF-4D09-0F7D-ACEFEB09D2BA}"/>
+              </a:ext>
+            </a:extLst>
+          </p:cNvPr>
+          <p:cNvPicPr>
+            <a:picLocks noChangeAspect="1"/>
+          </p:cNvPicPr>
+          <p:nvPr/>
+        </p:nvPicPr>
+        <p:blipFill>
+          <a:blip r:embed="rId2"/>
+          <a:stretch>
+            <a:fillRect/>
+          </a:stretch>
+        </p:blipFill>
+        <p:spPr>
+          <a:xfrm>
+            <a:off x="0" y="0"/>
+            <a:ext cx="10972800" cy="16459200"/>
+          </a:xfrm>
+          <a:prstGeom prst="rect">
+            <a:avLst/>
+          </a:prstGeom>
+        </p:spPr>
+      </p:pic>
+    </p:spTree>
+    <p:extLst>
+      <p:ext uri="{BB962C8B-B14F-4D97-AF65-F5344CB8AC3E}">
+        <p14:creationId xmlns:p14="http://schemas.microsoft.com/office/powerpoint/2010/main" val="2871812133"/>
+      </p:ext>
+    </p:extLst>
+  </p:cSld>
+  <p:clrMapOvr>
+    <a:masterClrMapping/>
+  </p:clrMapOvr>
+</p:sld>
+</file>
+
+<file path=ppt/slides/slide9.xml><?xml version="1.0" encoding="utf-8"?>
+<p:sld xmlns:a="http://schemas.openxmlformats.org/drawingml/2006/main" xmlns:r="http://schemas.openxmlformats.org/officeDocument/2006/relationships" xmlns:p="http://schemas.openxmlformats.org/presentationml/2006/main">
+  <p:cSld>
+    <p:spTree>
+      <p:nvGrpSpPr>
+        <p:cNvPr id="1" name=""/>
+        <p:cNvGrpSpPr/>
+        <p:nvPr/>
+      </p:nvGrpSpPr>
+      <p:grpSpPr>
+        <a:xfrm>
+          <a:off x="0" y="0"/>
+          <a:ext cx="0" cy="0"/>
+          <a:chOff x="0" y="0"/>
+          <a:chExt cx="0" cy="0"/>
+        </a:xfrm>
+      </p:grpSpPr>
+      <p:pic>
+        <p:nvPicPr>
+          <p:cNvPr id="3" name="Picture 2" descr="A graph of a graph&#10;&#10;Description automatically generated">
+            <a:extLst>
+              <a:ext uri="{FF2B5EF4-FFF2-40B4-BE49-F238E27FC236}">
+                <a16:creationId xmlns:a16="http://schemas.microsoft.com/office/drawing/2014/main" id="{9DFDDCDA-5621-A75B-B515-F96D6E7E25FC}"/>
+              </a:ext>
+            </a:extLst>
+          </p:cNvPr>
+          <p:cNvPicPr>
+            <a:picLocks noChangeAspect="1"/>
+          </p:cNvPicPr>
+          <p:nvPr/>
+        </p:nvPicPr>
+        <p:blipFill>
+          <a:blip r:embed="rId2"/>
+          <a:stretch>
+            <a:fillRect/>
+          </a:stretch>
+        </p:blipFill>
+        <p:spPr>
+          <a:xfrm>
+            <a:off x="0" y="0"/>
+            <a:ext cx="10972800" cy="16459200"/>
+          </a:xfrm>
+          <a:prstGeom prst="rect">
+            <a:avLst/>
+          </a:prstGeom>
+        </p:spPr>
+      </p:pic>
+    </p:spTree>
+    <p:extLst>
+      <p:ext uri="{BB962C8B-B14F-4D97-AF65-F5344CB8AC3E}">
+        <p14:creationId xmlns:p14="http://schemas.microsoft.com/office/powerpoint/2010/main" val="1917908094"/>
       </p:ext>
     </p:extLst>
   </p:cSld>

</xml_diff>